<commit_message>
drew robot out of wireframe
big
</commit_message>
<xml_diff>
--- a/assets/fuel_design.pptx
+++ b/assets/fuel_design.pptx
@@ -243,7 +243,7 @@
           <a:p>
             <a:fld id="{221BD5D6-CE8A-4A23-9E48-FAC422481BD0}" type="datetimeFigureOut">
               <a:rPr lang="de-CH" smtClean="0"/>
-              <a:t>12.05.2022</a:t>
+              <a:t>14.05.22</a:t>
             </a:fld>
             <a:endParaRPr lang="de-CH"/>
           </a:p>
@@ -285,7 +285,7 @@
           <a:p>
             <a:fld id="{7282DD37-900E-4409-81D7-FDEB7AB612C6}" type="slidenum">
               <a:rPr lang="de-CH" smtClean="0"/>
-              <a:t>‹Nr.›</a:t>
+              <a:t>‹#›</a:t>
             </a:fld>
             <a:endParaRPr lang="de-CH"/>
           </a:p>
@@ -413,7 +413,7 @@
           <a:p>
             <a:fld id="{221BD5D6-CE8A-4A23-9E48-FAC422481BD0}" type="datetimeFigureOut">
               <a:rPr lang="de-CH" smtClean="0"/>
-              <a:t>12.05.2022</a:t>
+              <a:t>14.05.22</a:t>
             </a:fld>
             <a:endParaRPr lang="de-CH"/>
           </a:p>
@@ -455,7 +455,7 @@
           <a:p>
             <a:fld id="{7282DD37-900E-4409-81D7-FDEB7AB612C6}" type="slidenum">
               <a:rPr lang="de-CH" smtClean="0"/>
-              <a:t>‹Nr.›</a:t>
+              <a:t>‹#›</a:t>
             </a:fld>
             <a:endParaRPr lang="de-CH"/>
           </a:p>
@@ -593,7 +593,7 @@
           <a:p>
             <a:fld id="{221BD5D6-CE8A-4A23-9E48-FAC422481BD0}" type="datetimeFigureOut">
               <a:rPr lang="de-CH" smtClean="0"/>
-              <a:t>12.05.2022</a:t>
+              <a:t>14.05.22</a:t>
             </a:fld>
             <a:endParaRPr lang="de-CH"/>
           </a:p>
@@ -635,7 +635,7 @@
           <a:p>
             <a:fld id="{7282DD37-900E-4409-81D7-FDEB7AB612C6}" type="slidenum">
               <a:rPr lang="de-CH" smtClean="0"/>
-              <a:t>‹Nr.›</a:t>
+              <a:t>‹#›</a:t>
             </a:fld>
             <a:endParaRPr lang="de-CH"/>
           </a:p>
@@ -763,7 +763,7 @@
           <a:p>
             <a:fld id="{221BD5D6-CE8A-4A23-9E48-FAC422481BD0}" type="datetimeFigureOut">
               <a:rPr lang="de-CH" smtClean="0"/>
-              <a:t>12.05.2022</a:t>
+              <a:t>14.05.22</a:t>
             </a:fld>
             <a:endParaRPr lang="de-CH"/>
           </a:p>
@@ -805,7 +805,7 @@
           <a:p>
             <a:fld id="{7282DD37-900E-4409-81D7-FDEB7AB612C6}" type="slidenum">
               <a:rPr lang="de-CH" smtClean="0"/>
-              <a:t>‹Nr.›</a:t>
+              <a:t>‹#›</a:t>
             </a:fld>
             <a:endParaRPr lang="de-CH"/>
           </a:p>
@@ -1007,7 +1007,7 @@
           <a:p>
             <a:fld id="{221BD5D6-CE8A-4A23-9E48-FAC422481BD0}" type="datetimeFigureOut">
               <a:rPr lang="de-CH" smtClean="0"/>
-              <a:t>12.05.2022</a:t>
+              <a:t>14.05.22</a:t>
             </a:fld>
             <a:endParaRPr lang="de-CH"/>
           </a:p>
@@ -1049,7 +1049,7 @@
           <a:p>
             <a:fld id="{7282DD37-900E-4409-81D7-FDEB7AB612C6}" type="slidenum">
               <a:rPr lang="de-CH" smtClean="0"/>
-              <a:t>‹Nr.›</a:t>
+              <a:t>‹#›</a:t>
             </a:fld>
             <a:endParaRPr lang="de-CH"/>
           </a:p>
@@ -1239,7 +1239,7 @@
           <a:p>
             <a:fld id="{221BD5D6-CE8A-4A23-9E48-FAC422481BD0}" type="datetimeFigureOut">
               <a:rPr lang="de-CH" smtClean="0"/>
-              <a:t>12.05.2022</a:t>
+              <a:t>14.05.22</a:t>
             </a:fld>
             <a:endParaRPr lang="de-CH"/>
           </a:p>
@@ -1281,7 +1281,7 @@
           <a:p>
             <a:fld id="{7282DD37-900E-4409-81D7-FDEB7AB612C6}" type="slidenum">
               <a:rPr lang="de-CH" smtClean="0"/>
-              <a:t>‹Nr.›</a:t>
+              <a:t>‹#›</a:t>
             </a:fld>
             <a:endParaRPr lang="de-CH"/>
           </a:p>
@@ -1606,7 +1606,7 @@
           <a:p>
             <a:fld id="{221BD5D6-CE8A-4A23-9E48-FAC422481BD0}" type="datetimeFigureOut">
               <a:rPr lang="de-CH" smtClean="0"/>
-              <a:t>12.05.2022</a:t>
+              <a:t>14.05.22</a:t>
             </a:fld>
             <a:endParaRPr lang="de-CH"/>
           </a:p>
@@ -1648,7 +1648,7 @@
           <a:p>
             <a:fld id="{7282DD37-900E-4409-81D7-FDEB7AB612C6}" type="slidenum">
               <a:rPr lang="de-CH" smtClean="0"/>
-              <a:t>‹Nr.›</a:t>
+              <a:t>‹#›</a:t>
             </a:fld>
             <a:endParaRPr lang="de-CH"/>
           </a:p>
@@ -1724,7 +1724,7 @@
           <a:p>
             <a:fld id="{221BD5D6-CE8A-4A23-9E48-FAC422481BD0}" type="datetimeFigureOut">
               <a:rPr lang="de-CH" smtClean="0"/>
-              <a:t>12.05.2022</a:t>
+              <a:t>14.05.22</a:t>
             </a:fld>
             <a:endParaRPr lang="de-CH"/>
           </a:p>
@@ -1766,7 +1766,7 @@
           <a:p>
             <a:fld id="{7282DD37-900E-4409-81D7-FDEB7AB612C6}" type="slidenum">
               <a:rPr lang="de-CH" smtClean="0"/>
-              <a:t>‹Nr.›</a:t>
+              <a:t>‹#›</a:t>
             </a:fld>
             <a:endParaRPr lang="de-CH"/>
           </a:p>
@@ -1819,7 +1819,7 @@
           <a:p>
             <a:fld id="{221BD5D6-CE8A-4A23-9E48-FAC422481BD0}" type="datetimeFigureOut">
               <a:rPr lang="de-CH" smtClean="0"/>
-              <a:t>12.05.2022</a:t>
+              <a:t>14.05.22</a:t>
             </a:fld>
             <a:endParaRPr lang="de-CH"/>
           </a:p>
@@ -1861,7 +1861,7 @@
           <a:p>
             <a:fld id="{7282DD37-900E-4409-81D7-FDEB7AB612C6}" type="slidenum">
               <a:rPr lang="de-CH" smtClean="0"/>
-              <a:t>‹Nr.›</a:t>
+              <a:t>‹#›</a:t>
             </a:fld>
             <a:endParaRPr lang="de-CH"/>
           </a:p>
@@ -2096,7 +2096,7 @@
           <a:p>
             <a:fld id="{221BD5D6-CE8A-4A23-9E48-FAC422481BD0}" type="datetimeFigureOut">
               <a:rPr lang="de-CH" smtClean="0"/>
-              <a:t>12.05.2022</a:t>
+              <a:t>14.05.22</a:t>
             </a:fld>
             <a:endParaRPr lang="de-CH"/>
           </a:p>
@@ -2138,7 +2138,7 @@
           <a:p>
             <a:fld id="{7282DD37-900E-4409-81D7-FDEB7AB612C6}" type="slidenum">
               <a:rPr lang="de-CH" smtClean="0"/>
-              <a:t>‹Nr.›</a:t>
+              <a:t>‹#›</a:t>
             </a:fld>
             <a:endParaRPr lang="de-CH"/>
           </a:p>
@@ -2353,7 +2353,7 @@
           <a:p>
             <a:fld id="{221BD5D6-CE8A-4A23-9E48-FAC422481BD0}" type="datetimeFigureOut">
               <a:rPr lang="de-CH" smtClean="0"/>
-              <a:t>12.05.2022</a:t>
+              <a:t>14.05.22</a:t>
             </a:fld>
             <a:endParaRPr lang="de-CH"/>
           </a:p>
@@ -2395,7 +2395,7 @@
           <a:p>
             <a:fld id="{7282DD37-900E-4409-81D7-FDEB7AB612C6}" type="slidenum">
               <a:rPr lang="de-CH" smtClean="0"/>
-              <a:t>‹Nr.›</a:t>
+              <a:t>‹#›</a:t>
             </a:fld>
             <a:endParaRPr lang="de-CH"/>
           </a:p>
@@ -2566,7 +2566,7 @@
           <a:p>
             <a:fld id="{221BD5D6-CE8A-4A23-9E48-FAC422481BD0}" type="datetimeFigureOut">
               <a:rPr lang="de-CH" smtClean="0"/>
-              <a:t>12.05.2022</a:t>
+              <a:t>14.05.22</a:t>
             </a:fld>
             <a:endParaRPr lang="de-CH"/>
           </a:p>
@@ -2644,7 +2644,7 @@
           <a:p>
             <a:fld id="{7282DD37-900E-4409-81D7-FDEB7AB612C6}" type="slidenum">
               <a:rPr lang="de-CH" smtClean="0"/>
-              <a:t>‹Nr.›</a:t>
+              <a:t>‹#›</a:t>
             </a:fld>
             <a:endParaRPr lang="de-CH"/>
           </a:p>
@@ -3367,7 +3367,11 @@
             <a:lstStyle/>
             <a:p>
               <a:pPr algn="ctr"/>
-              <a:endParaRPr lang="de-CH" sz="2040"/>
+              <a:endParaRPr lang="de-CH" sz="2040">
+                <a:solidFill>
+                  <a:srgbClr val="960000"/>
+                </a:solidFill>
+              </a:endParaRPr>
             </a:p>
           </p:txBody>
         </p:sp>

</xml_diff>